<commit_message>
Updating presentation to match as-presented status
</commit_message>
<xml_diff>
--- a/docs/whereabouts.pptx
+++ b/docs/whereabouts.pptx
@@ -120,7 +120,7 @@
   </p:defaultTextStyle>
   <p:extLst>
     <p:ext uri="{EFAFB233-063F-42B5-8137-9DF3F51BA10A}">
-      <p15:sldGuideLst xmlns:p15="http://schemas.microsoft.com/office/powerpoint/2012/main">
+      <p15:sldGuideLst xmlns="" xmlns:p15="http://schemas.microsoft.com/office/powerpoint/2012/main">
         <p15:guide id="1" orient="horz" pos="2160">
           <p15:clr>
             <a:srgbClr val="A4A3A4"/>
@@ -219,7 +219,7 @@
           <a:p>
             <a:fld id="{27AF73E5-9E31-7F46-A866-480CD38F6AF7}" type="datetimeFigureOut">
               <a:rPr lang="en-US" smtClean="0"/>
-              <a:t>5/15/2014</a:t>
+              <a:t>5/16/14</a:t>
             </a:fld>
             <a:endParaRPr lang="en-US"/>
           </a:p>
@@ -385,7 +385,7 @@
           <a:p>
             <a:fld id="{F6B03371-F305-1947-8199-97E5A645C75C}" type="datetimeFigureOut">
               <a:rPr lang="en-US" smtClean="0"/>
-              <a:t>5/15/2014</a:t>
+              <a:t>5/16/14</a:t>
             </a:fld>
             <a:endParaRPr lang="en-US"/>
           </a:p>
@@ -1590,7 +1590,7 @@
   <p:timing>
     <p:tnLst>
       <p:par>
-        <p:cTn id="1" dur="indefinite" restart="never" nodeType="tmRoot"/>
+        <p:cTn xmlns:p14="http://schemas.microsoft.com/office/powerpoint/2010/main" id="1" dur="indefinite" restart="never" nodeType="tmRoot"/>
       </p:par>
     </p:tnLst>
   </p:timing>
@@ -1786,7 +1786,7 @@
   <p:timing>
     <p:tnLst>
       <p:par>
-        <p:cTn id="1" dur="indefinite" restart="never" nodeType="tmRoot"/>
+        <p:cTn xmlns:p14="http://schemas.microsoft.com/office/powerpoint/2010/main" id="1" dur="indefinite" restart="never" nodeType="tmRoot"/>
       </p:par>
     </p:tnLst>
   </p:timing>
@@ -2039,7 +2039,7 @@
   <p:timing>
     <p:tnLst>
       <p:par>
-        <p:cTn id="1" dur="indefinite" restart="never" nodeType="tmRoot"/>
+        <p:cTn xmlns:p14="http://schemas.microsoft.com/office/powerpoint/2010/main" id="1" dur="indefinite" restart="never" nodeType="tmRoot"/>
       </p:par>
     </p:tnLst>
   </p:timing>
@@ -2334,7 +2334,7 @@
   <p:timing>
     <p:tnLst>
       <p:par>
-        <p:cTn id="1" dur="indefinite" restart="never" nodeType="tmRoot"/>
+        <p:cTn xmlns:p14="http://schemas.microsoft.com/office/powerpoint/2010/main" id="1" dur="indefinite" restart="never" nodeType="tmRoot"/>
       </p:par>
     </p:tnLst>
   </p:timing>
@@ -2763,7 +2763,7 @@
   <p:timing>
     <p:tnLst>
       <p:par>
-        <p:cTn id="1" dur="indefinite" restart="never" nodeType="tmRoot"/>
+        <p:cTn xmlns:p14="http://schemas.microsoft.com/office/powerpoint/2010/main" id="1" dur="indefinite" restart="never" nodeType="tmRoot"/>
       </p:par>
     </p:tnLst>
   </p:timing>
@@ -2888,7 +2888,7 @@
   <p:timing>
     <p:tnLst>
       <p:par>
-        <p:cTn id="1" dur="indefinite" restart="never" nodeType="tmRoot"/>
+        <p:cTn xmlns:p14="http://schemas.microsoft.com/office/powerpoint/2010/main" id="1" dur="indefinite" restart="never" nodeType="tmRoot"/>
       </p:par>
     </p:tnLst>
   </p:timing>
@@ -2990,7 +2990,7 @@
   <p:timing>
     <p:tnLst>
       <p:par>
-        <p:cTn id="1" dur="indefinite" restart="never" nodeType="tmRoot"/>
+        <p:cTn xmlns:p14="http://schemas.microsoft.com/office/powerpoint/2010/main" id="1" dur="indefinite" restart="never" nodeType="tmRoot"/>
       </p:par>
     </p:tnLst>
   </p:timing>
@@ -3330,7 +3330,7 @@
   <p:timing>
     <p:tnLst>
       <p:par>
-        <p:cTn id="1" dur="indefinite" restart="never" nodeType="tmRoot"/>
+        <p:cTn xmlns:p14="http://schemas.microsoft.com/office/powerpoint/2010/main" id="1" dur="indefinite" restart="never" nodeType="tmRoot"/>
       </p:par>
     </p:tnLst>
   </p:timing>
@@ -3650,27 +3650,7 @@
           <a:p>
             <a:r>
               <a:rPr lang="en-US" dirty="0" smtClean="0"/>
-              <a:t>TerraSwarm Localization Worksho</a:t>
-            </a:r>
-            <a:r>
-              <a:rPr lang="en-US" dirty="0" smtClean="0"/>
-              <a:t>p.</a:t>
-            </a:r>
-            <a:r>
-              <a:rPr lang="en-US" dirty="0" smtClean="0"/>
-              <a:t> </a:t>
-            </a:r>
-            <a:r>
-              <a:rPr lang="en-US" dirty="0" smtClean="0"/>
-              <a:t>Ann Arbor, MI</a:t>
-            </a:r>
-            <a:r>
-              <a:rPr lang="en-US" dirty="0" smtClean="0"/>
-              <a:t>.  May 16, </a:t>
-            </a:r>
-            <a:r>
-              <a:rPr lang="en-US" dirty="0" smtClean="0"/>
-              <a:t>2014</a:t>
+              <a:t>TerraSwarm Localization Workshop. Ann Arbor, MI.  May 16, 2014</a:t>
             </a:r>
             <a:endParaRPr lang="en-US" dirty="0"/>
           </a:p>
@@ -4039,7 +4019,7 @@
   <p:timing>
     <p:tnLst>
       <p:par>
-        <p:cTn id="1" dur="indefinite" restart="never" nodeType="tmRoot"/>
+        <p:cTn xmlns:p14="http://schemas.microsoft.com/office/powerpoint/2010/main" id="1" dur="indefinite" restart="never" nodeType="tmRoot"/>
       </p:par>
     </p:tnLst>
   </p:timing>
@@ -4184,7 +4164,7 @@
   <p:timing>
     <p:tnLst>
       <p:par>
-        <p:cTn id="1" dur="indefinite" restart="never" nodeType="tmRoot"/>
+        <p:cTn xmlns:p14="http://schemas.microsoft.com/office/powerpoint/2010/main" id="1" dur="indefinite" restart="never" nodeType="tmRoot"/>
       </p:par>
     </p:tnLst>
   </p:timing>
@@ -4594,7 +4574,7 @@
   <p:timing>
     <p:tnLst>
       <p:par>
-        <p:cTn id="1" dur="indefinite" restart="never" nodeType="tmRoot"/>
+        <p:cTn xmlns:p14="http://schemas.microsoft.com/office/powerpoint/2010/main" id="1" dur="indefinite" restart="never" nodeType="tmRoot"/>
       </p:par>
     </p:tnLst>
   </p:timing>
@@ -4868,7 +4848,7 @@
           </a:prstGeom>
           <a:noFill/>
           <a:extLst>
-            <a:ext uri="{909E8E84-426E-40DD-AFC4-6F175D3DCCD1}">
+            <a:ext uri="{909E8E84-426E-40dd-AFC4-6F175D3DCCD1}">
               <a14:hiddenFill xmlns:a14="http://schemas.microsoft.com/office/drawing/2010/main">
                 <a:solidFill>
                   <a:srgbClr val="FFFFFF"/>
@@ -4909,7 +4889,7 @@
           </a:prstGeom>
           <a:noFill/>
           <a:extLst>
-            <a:ext uri="{909E8E84-426E-40DD-AFC4-6F175D3DCCD1}">
+            <a:ext uri="{909E8E84-426E-40dd-AFC4-6F175D3DCCD1}">
               <a14:hiddenFill xmlns:a14="http://schemas.microsoft.com/office/drawing/2010/main">
                 <a:solidFill>
                   <a:srgbClr val="FFFFFF"/>
@@ -4932,7 +4912,7 @@
   <p:timing>
     <p:tnLst>
       <p:par>
-        <p:cTn id="1" dur="indefinite" restart="never" nodeType="tmRoot"/>
+        <p:cTn xmlns:p14="http://schemas.microsoft.com/office/powerpoint/2010/main" id="1" dur="indefinite" restart="never" nodeType="tmRoot"/>
       </p:par>
     </p:tnLst>
   </p:timing>
@@ -5108,7 +5088,7 @@
           </a:prstGeom>
           <a:noFill/>
           <a:extLst>
-            <a:ext uri="{909E8E84-426E-40DD-AFC4-6F175D3DCCD1}">
+            <a:ext uri="{909E8E84-426E-40dd-AFC4-6F175D3DCCD1}">
               <a14:hiddenFill xmlns:a14="http://schemas.microsoft.com/office/drawing/2010/main">
                 <a:solidFill>
                   <a:srgbClr val="FFFFFF"/>
@@ -5154,7 +5134,7 @@
   <p:timing>
     <p:tnLst>
       <p:par>
-        <p:cTn id="1" dur="indefinite" restart="never" nodeType="tmRoot"/>
+        <p:cTn xmlns:p14="http://schemas.microsoft.com/office/powerpoint/2010/main" id="1" dur="indefinite" restart="never" nodeType="tmRoot"/>
       </p:par>
     </p:tnLst>
   </p:timing>
@@ -5658,225 +5638,9 @@
   <p:timing>
     <p:tnLst>
       <p:par>
-        <p:cTn id="1" dur="indefinite" restart="never" nodeType="tmRoot">
-          <p:childTnLst>
-            <p:seq concurrent="1" nextAc="seek">
-              <p:cTn id="2" dur="indefinite" nodeType="mainSeq">
-                <p:childTnLst>
-                  <p:par>
-                    <p:cTn id="3" fill="hold">
-                      <p:stCondLst>
-                        <p:cond delay="indefinite"/>
-                      </p:stCondLst>
-                      <p:childTnLst>
-                        <p:par>
-                          <p:cTn id="4" fill="hold">
-                            <p:stCondLst>
-                              <p:cond delay="0"/>
-                            </p:stCondLst>
-                            <p:childTnLst>
-                              <p:par>
-                                <p:cTn id="5" presetID="2" presetClass="entr" presetSubtype="2" fill="hold" nodeType="clickEffect">
-                                  <p:stCondLst>
-                                    <p:cond delay="0"/>
-                                  </p:stCondLst>
-                                  <p:childTnLst>
-                                    <p:set>
-                                      <p:cBhvr>
-                                        <p:cTn id="6" dur="1" fill="hold">
-                                          <p:stCondLst>
-                                            <p:cond delay="0"/>
-                                          </p:stCondLst>
-                                        </p:cTn>
-                                        <p:tgtEl>
-                                          <p:spTgt spid="15"/>
-                                        </p:tgtEl>
-                                        <p:attrNameLst>
-                                          <p:attrName>style.visibility</p:attrName>
-                                        </p:attrNameLst>
-                                      </p:cBhvr>
-                                      <p:to>
-                                        <p:strVal val="visible"/>
-                                      </p:to>
-                                    </p:set>
-                                    <p:anim calcmode="lin" valueType="num">
-                                      <p:cBhvr additive="base">
-                                        <p:cTn id="7" dur="1000" fill="hold"/>
-                                        <p:tgtEl>
-                                          <p:spTgt spid="15"/>
-                                        </p:tgtEl>
-                                        <p:attrNameLst>
-                                          <p:attrName>ppt_x</p:attrName>
-                                        </p:attrNameLst>
-                                      </p:cBhvr>
-                                      <p:tavLst>
-                                        <p:tav tm="0">
-                                          <p:val>
-                                            <p:strVal val="1+#ppt_w/2"/>
-                                          </p:val>
-                                        </p:tav>
-                                        <p:tav tm="100000">
-                                          <p:val>
-                                            <p:strVal val="#ppt_x"/>
-                                          </p:val>
-                                        </p:tav>
-                                      </p:tavLst>
-                                    </p:anim>
-                                    <p:anim calcmode="lin" valueType="num">
-                                      <p:cBhvr additive="base">
-                                        <p:cTn id="8" dur="1000" fill="hold"/>
-                                        <p:tgtEl>
-                                          <p:spTgt spid="15"/>
-                                        </p:tgtEl>
-                                        <p:attrNameLst>
-                                          <p:attrName>ppt_y</p:attrName>
-                                        </p:attrNameLst>
-                                      </p:cBhvr>
-                                      <p:tavLst>
-                                        <p:tav tm="0">
-                                          <p:val>
-                                            <p:strVal val="#ppt_y"/>
-                                          </p:val>
-                                        </p:tav>
-                                        <p:tav tm="100000">
-                                          <p:val>
-                                            <p:strVal val="#ppt_y"/>
-                                          </p:val>
-                                        </p:tav>
-                                      </p:tavLst>
-                                    </p:anim>
-                                  </p:childTnLst>
-                                </p:cTn>
-                              </p:par>
-                            </p:childTnLst>
-                          </p:cTn>
-                        </p:par>
-                      </p:childTnLst>
-                    </p:cTn>
-                  </p:par>
-                  <p:par>
-                    <p:cTn id="9" fill="hold">
-                      <p:stCondLst>
-                        <p:cond delay="indefinite"/>
-                      </p:stCondLst>
-                      <p:childTnLst>
-                        <p:par>
-                          <p:cTn id="10" fill="hold">
-                            <p:stCondLst>
-                              <p:cond delay="0"/>
-                            </p:stCondLst>
-                            <p:childTnLst>
-                              <p:par>
-                                <p:cTn id="11" presetID="42" presetClass="entr" presetSubtype="0" fill="hold" grpId="0" nodeType="clickEffect">
-                                  <p:stCondLst>
-                                    <p:cond delay="0"/>
-                                  </p:stCondLst>
-                                  <p:childTnLst>
-                                    <p:set>
-                                      <p:cBhvr>
-                                        <p:cTn id="12" dur="1" fill="hold">
-                                          <p:stCondLst>
-                                            <p:cond delay="0"/>
-                                          </p:stCondLst>
-                                        </p:cTn>
-                                        <p:tgtEl>
-                                          <p:spTgt spid="21"/>
-                                        </p:tgtEl>
-                                        <p:attrNameLst>
-                                          <p:attrName>style.visibility</p:attrName>
-                                        </p:attrNameLst>
-                                      </p:cBhvr>
-                                      <p:to>
-                                        <p:strVal val="visible"/>
-                                      </p:to>
-                                    </p:set>
-                                    <p:animEffect transition="in" filter="fade">
-                                      <p:cBhvr>
-                                        <p:cTn id="13" dur="750"/>
-                                        <p:tgtEl>
-                                          <p:spTgt spid="21"/>
-                                        </p:tgtEl>
-                                      </p:cBhvr>
-                                    </p:animEffect>
-                                    <p:anim calcmode="lin" valueType="num">
-                                      <p:cBhvr>
-                                        <p:cTn id="14" dur="750" fill="hold"/>
-                                        <p:tgtEl>
-                                          <p:spTgt spid="21"/>
-                                        </p:tgtEl>
-                                        <p:attrNameLst>
-                                          <p:attrName>ppt_x</p:attrName>
-                                        </p:attrNameLst>
-                                      </p:cBhvr>
-                                      <p:tavLst>
-                                        <p:tav tm="0">
-                                          <p:val>
-                                            <p:strVal val="#ppt_x"/>
-                                          </p:val>
-                                        </p:tav>
-                                        <p:tav tm="100000">
-                                          <p:val>
-                                            <p:strVal val="#ppt_x"/>
-                                          </p:val>
-                                        </p:tav>
-                                      </p:tavLst>
-                                    </p:anim>
-                                    <p:anim calcmode="lin" valueType="num">
-                                      <p:cBhvr>
-                                        <p:cTn id="15" dur="750" fill="hold"/>
-                                        <p:tgtEl>
-                                          <p:spTgt spid="21"/>
-                                        </p:tgtEl>
-                                        <p:attrNameLst>
-                                          <p:attrName>ppt_y</p:attrName>
-                                        </p:attrNameLst>
-                                      </p:cBhvr>
-                                      <p:tavLst>
-                                        <p:tav tm="0">
-                                          <p:val>
-                                            <p:strVal val="#ppt_y+.1"/>
-                                          </p:val>
-                                        </p:tav>
-                                        <p:tav tm="100000">
-                                          <p:val>
-                                            <p:strVal val="#ppt_y"/>
-                                          </p:val>
-                                        </p:tav>
-                                      </p:tavLst>
-                                    </p:anim>
-                                  </p:childTnLst>
-                                </p:cTn>
-                              </p:par>
-                            </p:childTnLst>
-                          </p:cTn>
-                        </p:par>
-                      </p:childTnLst>
-                    </p:cTn>
-                  </p:par>
-                </p:childTnLst>
-              </p:cTn>
-              <p:prevCondLst>
-                <p:cond evt="onPrev" delay="0">
-                  <p:tgtEl>
-                    <p:sldTgt/>
-                  </p:tgtEl>
-                </p:cond>
-              </p:prevCondLst>
-              <p:nextCondLst>
-                <p:cond evt="onNext" delay="0">
-                  <p:tgtEl>
-                    <p:sldTgt/>
-                  </p:tgtEl>
-                </p:cond>
-              </p:nextCondLst>
-            </p:seq>
-          </p:childTnLst>
-        </p:cTn>
+        <p:cTn xmlns:p14="http://schemas.microsoft.com/office/powerpoint/2010/main" id="1" dur="indefinite" restart="never" nodeType="tmRoot"/>
       </p:par>
     </p:tnLst>
-    <p:bldLst>
-      <p:bldP spid="21" grpId="0" animBg="1"/>
-    </p:bldLst>
   </p:timing>
 </p:sld>
 </file>
@@ -6156,7 +5920,7 @@
   <p:timing>
     <p:tnLst>
       <p:par>
-        <p:cTn id="1" dur="indefinite" restart="never" nodeType="tmRoot"/>
+        <p:cTn xmlns:p14="http://schemas.microsoft.com/office/powerpoint/2010/main" id="1" dur="indefinite" restart="never" nodeType="tmRoot"/>
       </p:par>
     </p:tnLst>
   </p:timing>
@@ -6380,7 +6144,7 @@
   <p:timing>
     <p:tnLst>
       <p:par>
-        <p:cTn id="1" dur="indefinite" restart="never" nodeType="tmRoot"/>
+        <p:cTn xmlns:p14="http://schemas.microsoft.com/office/powerpoint/2010/main" id="1" dur="indefinite" restart="never" nodeType="tmRoot"/>
       </p:par>
     </p:tnLst>
   </p:timing>
@@ -6512,8 +6276,8 @@
         </p:nvSpPr>
         <p:spPr>
           <a:xfrm>
-            <a:off x="3780821" y="5543559"/>
-            <a:ext cx="5032978" cy="369332"/>
+            <a:off x="2513724" y="5543559"/>
+            <a:ext cx="6300075" cy="369332"/>
           </a:xfrm>
           <a:prstGeom prst="rect">
             <a:avLst/>
@@ -6533,6 +6297,66 @@
           </a:p>
         </p:txBody>
       </p:sp>
+      <p:sp>
+        <p:nvSpPr>
+          <p:cNvPr id="9" name="TextBox 8"/>
+          <p:cNvSpPr txBox="1"/>
+          <p:nvPr/>
+        </p:nvSpPr>
+        <p:spPr>
+          <a:xfrm>
+            <a:off x="2513724" y="6065291"/>
+            <a:ext cx="6300075" cy="369332"/>
+          </a:xfrm>
+          <a:prstGeom prst="rect">
+            <a:avLst/>
+          </a:prstGeom>
+          <a:noFill/>
+        </p:spPr>
+        <p:txBody>
+          <a:bodyPr wrap="square" rtlCol="0">
+            <a:spAutoFit/>
+          </a:bodyPr>
+          <a:lstStyle/>
+          <a:p>
+            <a:r>
+              <a:rPr lang="en-US" b="1" dirty="0"/>
+              <a:t>https://github.com/lab11/whereabouts</a:t>
+            </a:r>
+            <a:endParaRPr lang="en-US" b="1" dirty="0"/>
+          </a:p>
+        </p:txBody>
+      </p:sp>
+      <p:pic>
+        <p:nvPicPr>
+          <p:cNvPr id="3" name="Picture 2" descr="qrcode.22379549.png"/>
+          <p:cNvPicPr>
+            <a:picLocks noChangeAspect="1"/>
+          </p:cNvPicPr>
+          <p:nvPr/>
+        </p:nvPicPr>
+        <p:blipFill>
+          <a:blip r:embed="rId4">
+            <a:extLst>
+              <a:ext uri="{28A0092B-C50C-407E-A947-70E740481C1C}">
+                <a14:useLocalDpi xmlns:a14="http://schemas.microsoft.com/office/drawing/2010/main" val="0"/>
+              </a:ext>
+            </a:extLst>
+          </a:blip>
+          <a:stretch>
+            <a:fillRect/>
+          </a:stretch>
+        </p:blipFill>
+        <p:spPr>
+          <a:xfrm>
+            <a:off x="584199" y="4968874"/>
+            <a:ext cx="1620345" cy="1620345"/>
+          </a:xfrm>
+          <a:prstGeom prst="rect">
+            <a:avLst/>
+          </a:prstGeom>
+        </p:spPr>
+      </p:pic>
     </p:spTree>
     <p:extLst>
       <p:ext uri="{BB962C8B-B14F-4D97-AF65-F5344CB8AC3E}">
@@ -6546,7 +6370,7 @@
   <p:timing>
     <p:tnLst>
       <p:par>
-        <p:cTn id="1" dur="indefinite" restart="never" nodeType="tmRoot"/>
+        <p:cTn xmlns:p14="http://schemas.microsoft.com/office/powerpoint/2010/main" id="1" dur="indefinite" restart="never" nodeType="tmRoot"/>
       </p:par>
     </p:tnLst>
   </p:timing>

</xml_diff>